<commit_message>
- Configuration of water level
</commit_message>
<xml_diff>
--- a/icons/today template.pptx
+++ b/icons/today template.pptx
@@ -108,6 +108,11 @@
       </a:defRPr>
     </a:lvl9pPr>
   </p:defaultTextStyle>
+  <p:extLst>
+    <p:ext uri="{EFAFB233-063F-42B5-8137-9DF3F51BA10A}">
+      <p15:sldGuideLst xmlns:p15="http://schemas.microsoft.com/office/powerpoint/2012/main"/>
+    </p:ext>
+  </p:extLst>
 </p:presentation>
 </file>
 
@@ -168,7 +173,6 @@
               <a:rPr lang="en-US"/>
               <a:t>Click to edit Master title style</a:t>
             </a:r>
-            <a:endParaRPr lang="en-US"/>
           </a:p>
         </p:txBody>
       </p:sp>
@@ -233,7 +237,6 @@
               <a:rPr lang="en-US"/>
               <a:t>Click to edit Master subtitle style</a:t>
             </a:r>
-            <a:endParaRPr lang="en-US"/>
           </a:p>
         </p:txBody>
       </p:sp>
@@ -351,7 +354,6 @@
               <a:rPr lang="en-US"/>
               <a:t>Click to edit Master title style</a:t>
             </a:r>
-            <a:endParaRPr lang="en-US"/>
           </a:p>
         </p:txBody>
       </p:sp>
@@ -403,7 +405,6 @@
               <a:rPr lang="en-US"/>
               <a:t>Fifth level</a:t>
             </a:r>
-            <a:endParaRPr lang="en-US"/>
           </a:p>
         </p:txBody>
       </p:sp>
@@ -526,7 +527,6 @@
               <a:rPr lang="en-US"/>
               <a:t>Click to edit Master title style</a:t>
             </a:r>
-            <a:endParaRPr lang="en-US"/>
           </a:p>
         </p:txBody>
       </p:sp>
@@ -583,7 +583,6 @@
               <a:rPr lang="en-US"/>
               <a:t>Fifth level</a:t>
             </a:r>
-            <a:endParaRPr lang="en-US"/>
           </a:p>
         </p:txBody>
       </p:sp>
@@ -701,7 +700,6 @@
               <a:rPr lang="en-US"/>
               <a:t>Click to edit Master title style</a:t>
             </a:r>
-            <a:endParaRPr lang="en-US"/>
           </a:p>
         </p:txBody>
       </p:sp>
@@ -753,7 +751,6 @@
               <a:rPr lang="en-US"/>
               <a:t>Fifth level</a:t>
             </a:r>
-            <a:endParaRPr lang="en-US"/>
           </a:p>
         </p:txBody>
       </p:sp>
@@ -880,7 +877,6 @@
               <a:rPr lang="en-US"/>
               <a:t>Click to edit Master title style</a:t>
             </a:r>
-            <a:endParaRPr lang="en-US"/>
           </a:p>
         </p:txBody>
       </p:sp>
@@ -1117,7 +1113,6 @@
               <a:rPr lang="en-US"/>
               <a:t>Click to edit Master title style</a:t>
             </a:r>
-            <a:endParaRPr lang="en-US"/>
           </a:p>
         </p:txBody>
       </p:sp>
@@ -1174,7 +1169,6 @@
               <a:rPr lang="en-US"/>
               <a:t>Fifth level</a:t>
             </a:r>
-            <a:endParaRPr lang="en-US"/>
           </a:p>
         </p:txBody>
       </p:sp>
@@ -1231,7 +1225,6 @@
               <a:rPr lang="en-US"/>
               <a:t>Fifth level</a:t>
             </a:r>
-            <a:endParaRPr lang="en-US"/>
           </a:p>
         </p:txBody>
       </p:sp>
@@ -1354,7 +1347,6 @@
               <a:rPr lang="en-US"/>
               <a:t>Click to edit Master title style</a:t>
             </a:r>
-            <a:endParaRPr lang="en-US"/>
           </a:p>
         </p:txBody>
       </p:sp>
@@ -1476,7 +1468,6 @@
               <a:rPr lang="en-US"/>
               <a:t>Fifth level</a:t>
             </a:r>
-            <a:endParaRPr lang="en-US"/>
           </a:p>
         </p:txBody>
       </p:sp>
@@ -1598,7 +1589,6 @@
               <a:rPr lang="en-US"/>
               <a:t>Fifth level</a:t>
             </a:r>
-            <a:endParaRPr lang="en-US"/>
           </a:p>
         </p:txBody>
       </p:sp>
@@ -1716,7 +1706,6 @@
               <a:rPr lang="en-US"/>
               <a:t>Click to edit Master title style</a:t>
             </a:r>
-            <a:endParaRPr lang="en-US"/>
           </a:p>
         </p:txBody>
       </p:sp>
@@ -1938,7 +1927,6 @@
               <a:rPr lang="en-US"/>
               <a:t>Click to edit Master title style</a:t>
             </a:r>
-            <a:endParaRPr lang="en-US"/>
           </a:p>
         </p:txBody>
       </p:sp>
@@ -2023,7 +2011,6 @@
               <a:rPr lang="en-US"/>
               <a:t>Fifth level</a:t>
             </a:r>
-            <a:endParaRPr lang="en-US"/>
           </a:p>
         </p:txBody>
       </p:sp>
@@ -2215,7 +2202,6 @@
               <a:rPr lang="en-US"/>
               <a:t>Click to edit Master title style</a:t>
             </a:r>
-            <a:endParaRPr lang="en-US"/>
           </a:p>
         </p:txBody>
       </p:sp>
@@ -2474,7 +2460,6 @@
               <a:rPr lang="en-US"/>
               <a:t>Click to edit Master title style</a:t>
             </a:r>
-            <a:endParaRPr lang="en-US"/>
           </a:p>
         </p:txBody>
       </p:sp>
@@ -2536,7 +2521,6 @@
               <a:rPr lang="en-US"/>
               <a:t>Fifth level</a:t>
             </a:r>
-            <a:endParaRPr lang="en-US"/>
           </a:p>
         </p:txBody>
       </p:sp>
@@ -3067,7 +3051,7 @@
         </p:nvSpPr>
         <p:spPr>
           <a:xfrm>
-            <a:off x="8524903" y="1764788"/>
+            <a:off x="4593201" y="1637191"/>
             <a:ext cx="3040999" cy="2958816"/>
           </a:xfrm>
           <a:prstGeom prst="pie">
@@ -3149,7 +3133,7 @@
         </p:blipFill>
         <p:spPr>
           <a:xfrm>
-            <a:off x="7837523" y="1637191"/>
+            <a:off x="5386845" y="1985649"/>
             <a:ext cx="1374761" cy="1374761"/>
           </a:xfrm>
           <a:prstGeom prst="rect">

</xml_diff>

<commit_message>
- Profile in progress - today almost done
</commit_message>
<xml_diff>
--- a/icons/today template.pptx
+++ b/icons/today template.pptx
@@ -257,7 +257,7 @@
           <a:p>
             <a:fld id="{48EB5E4B-7BFA-4B82-9B95-E7891D90587C}" type="datetimeFigureOut">
               <a:rPr lang="en-US" smtClean="0"/>
-              <a:t>11/15/2016</a:t>
+              <a:t>11/17/2016</a:t>
             </a:fld>
             <a:endParaRPr lang="en-US"/>
           </a:p>
@@ -425,7 +425,7 @@
           <a:p>
             <a:fld id="{48EB5E4B-7BFA-4B82-9B95-E7891D90587C}" type="datetimeFigureOut">
               <a:rPr lang="en-US" smtClean="0"/>
-              <a:t>11/15/2016</a:t>
+              <a:t>11/17/2016</a:t>
             </a:fld>
             <a:endParaRPr lang="en-US"/>
           </a:p>
@@ -603,7 +603,7 @@
           <a:p>
             <a:fld id="{48EB5E4B-7BFA-4B82-9B95-E7891D90587C}" type="datetimeFigureOut">
               <a:rPr lang="en-US" smtClean="0"/>
-              <a:t>11/15/2016</a:t>
+              <a:t>11/17/2016</a:t>
             </a:fld>
             <a:endParaRPr lang="en-US"/>
           </a:p>
@@ -771,7 +771,7 @@
           <a:p>
             <a:fld id="{48EB5E4B-7BFA-4B82-9B95-E7891D90587C}" type="datetimeFigureOut">
               <a:rPr lang="en-US" smtClean="0"/>
-              <a:t>11/15/2016</a:t>
+              <a:t>11/17/2016</a:t>
             </a:fld>
             <a:endParaRPr lang="en-US"/>
           </a:p>
@@ -1016,7 +1016,7 @@
           <a:p>
             <a:fld id="{48EB5E4B-7BFA-4B82-9B95-E7891D90587C}" type="datetimeFigureOut">
               <a:rPr lang="en-US" smtClean="0"/>
-              <a:t>11/15/2016</a:t>
+              <a:t>11/17/2016</a:t>
             </a:fld>
             <a:endParaRPr lang="en-US"/>
           </a:p>
@@ -1245,7 +1245,7 @@
           <a:p>
             <a:fld id="{48EB5E4B-7BFA-4B82-9B95-E7891D90587C}" type="datetimeFigureOut">
               <a:rPr lang="en-US" smtClean="0"/>
-              <a:t>11/15/2016</a:t>
+              <a:t>11/17/2016</a:t>
             </a:fld>
             <a:endParaRPr lang="en-US"/>
           </a:p>
@@ -1609,7 +1609,7 @@
           <a:p>
             <a:fld id="{48EB5E4B-7BFA-4B82-9B95-E7891D90587C}" type="datetimeFigureOut">
               <a:rPr lang="en-US" smtClean="0"/>
-              <a:t>11/15/2016</a:t>
+              <a:t>11/17/2016</a:t>
             </a:fld>
             <a:endParaRPr lang="en-US"/>
           </a:p>
@@ -1726,7 +1726,7 @@
           <a:p>
             <a:fld id="{48EB5E4B-7BFA-4B82-9B95-E7891D90587C}" type="datetimeFigureOut">
               <a:rPr lang="en-US" smtClean="0"/>
-              <a:t>11/15/2016</a:t>
+              <a:t>11/17/2016</a:t>
             </a:fld>
             <a:endParaRPr lang="en-US"/>
           </a:p>
@@ -1821,7 +1821,7 @@
           <a:p>
             <a:fld id="{48EB5E4B-7BFA-4B82-9B95-E7891D90587C}" type="datetimeFigureOut">
               <a:rPr lang="en-US" smtClean="0"/>
-              <a:t>11/15/2016</a:t>
+              <a:t>11/17/2016</a:t>
             </a:fld>
             <a:endParaRPr lang="en-US"/>
           </a:p>
@@ -2096,7 +2096,7 @@
           <a:p>
             <a:fld id="{48EB5E4B-7BFA-4B82-9B95-E7891D90587C}" type="datetimeFigureOut">
               <a:rPr lang="en-US" smtClean="0"/>
-              <a:t>11/15/2016</a:t>
+              <a:t>11/17/2016</a:t>
             </a:fld>
             <a:endParaRPr lang="en-US"/>
           </a:p>
@@ -2348,7 +2348,7 @@
           <a:p>
             <a:fld id="{48EB5E4B-7BFA-4B82-9B95-E7891D90587C}" type="datetimeFigureOut">
               <a:rPr lang="en-US" smtClean="0"/>
-              <a:t>11/15/2016</a:t>
+              <a:t>11/17/2016</a:t>
             </a:fld>
             <a:endParaRPr lang="en-US"/>
           </a:p>
@@ -2559,7 +2559,7 @@
           <a:p>
             <a:fld id="{48EB5E4B-7BFA-4B82-9B95-E7891D90587C}" type="datetimeFigureOut">
               <a:rPr lang="en-US" smtClean="0"/>
-              <a:t>11/15/2016</a:t>
+              <a:t>11/17/2016</a:t>
             </a:fld>
             <a:endParaRPr lang="en-US"/>
           </a:p>
@@ -3320,6 +3320,7 @@
 <file path=ppt/tags/tag1.xml><?xml version="1.0" encoding="utf-8"?>
 <p:tagLst xmlns:a="http://schemas.openxmlformats.org/drawingml/2006/main" xmlns:r="http://schemas.openxmlformats.org/officeDocument/2006/relationships" xmlns:p="http://schemas.openxmlformats.org/presentationml/2006/main">
   <p:tag name="_AMO_UNIQUEIDENTIFIER" val="2623bcf6-fcee-4c8f-8cc6-9f237db28ab3"/>
+  <p:tag name="_AMO_REPORTCONTROLSVISIBLE" val="Empty"/>
 </p:tagLst>
 </file>
 

</xml_diff>

<commit_message>
- completion of profile and today, left with integration with backend
</commit_message>
<xml_diff>
--- a/icons/today template.pptx
+++ b/icons/today template.pptx
@@ -6,12 +6,13 @@
   </p:sldMasterIdLst>
   <p:sldIdLst>
     <p:sldId id="256" r:id="rId2"/>
-    <p:sldId id="257" r:id="rId3"/>
+    <p:sldId id="258" r:id="rId3"/>
+    <p:sldId id="257" r:id="rId4"/>
   </p:sldIdLst>
   <p:sldSz cx="12192000" cy="6858000"/>
   <p:notesSz cx="6858000" cy="9144000"/>
   <p:custDataLst>
-    <p:tags r:id="rId4"/>
+    <p:tags r:id="rId5"/>
   </p:custDataLst>
   <p:defaultTextStyle>
     <a:defPPr>
@@ -3257,6 +3258,60 @@
 </file>
 
 <file path=ppt/slides/slide2.xml><?xml version="1.0" encoding="utf-8"?>
+<p:sld xmlns:a="http://schemas.openxmlformats.org/drawingml/2006/main" xmlns:r="http://schemas.openxmlformats.org/officeDocument/2006/relationships" xmlns:p="http://schemas.openxmlformats.org/presentationml/2006/main">
+  <p:cSld>
+    <p:spTree>
+      <p:nvGrpSpPr>
+        <p:cNvPr id="1" name=""/>
+        <p:cNvGrpSpPr/>
+        <p:nvPr/>
+      </p:nvGrpSpPr>
+      <p:grpSpPr>
+        <a:xfrm>
+          <a:off x="0" y="0"/>
+          <a:ext cx="0" cy="0"/>
+          <a:chOff x="0" y="0"/>
+          <a:chExt cx="0" cy="0"/>
+        </a:xfrm>
+      </p:grpSpPr>
+      <p:pic>
+        <p:nvPicPr>
+          <p:cNvPr id="2" name="Picture 1"/>
+          <p:cNvPicPr>
+            <a:picLocks noChangeAspect="1"/>
+          </p:cNvPicPr>
+          <p:nvPr/>
+        </p:nvPicPr>
+        <p:blipFill>
+          <a:blip r:embed="rId2"/>
+          <a:stretch>
+            <a:fillRect/>
+          </a:stretch>
+        </p:blipFill>
+        <p:spPr>
+          <a:xfrm>
+            <a:off x="4336644" y="0"/>
+            <a:ext cx="3518712" cy="6858000"/>
+          </a:xfrm>
+          <a:prstGeom prst="rect">
+            <a:avLst/>
+          </a:prstGeom>
+        </p:spPr>
+      </p:pic>
+    </p:spTree>
+    <p:extLst>
+      <p:ext uri="{BB962C8B-B14F-4D97-AF65-F5344CB8AC3E}">
+        <p14:creationId xmlns:p14="http://schemas.microsoft.com/office/powerpoint/2010/main" val="3478253947"/>
+      </p:ext>
+    </p:extLst>
+  </p:cSld>
+  <p:clrMapOvr>
+    <a:masterClrMapping/>
+  </p:clrMapOvr>
+</p:sld>
+</file>
+
+<file path=ppt/slides/slide3.xml><?xml version="1.0" encoding="utf-8"?>
 <p:sld xmlns:a="http://schemas.openxmlformats.org/drawingml/2006/main" xmlns:r="http://schemas.openxmlformats.org/officeDocument/2006/relationships" xmlns:p="http://schemas.openxmlformats.org/presentationml/2006/main">
   <p:cSld>
     <p:spTree>

</xml_diff>